<commit_message>
Attaching a new Demo
</commit_message>
<xml_diff>
--- a/artifacts/demo/Hackathon 2025- Cloud Crowd.pptx
+++ b/artifacts/demo/Hackathon 2025- Cloud Crowd.pptx
@@ -114,6 +114,11 @@
       </a:defRPr>
     </a:lvl9pPr>
   </p:defaultTextStyle>
+  <p:extLst>
+    <p:ext uri="{EFAFB233-063F-42B5-8137-9DF3F51BA10A}">
+      <p15:sldGuideLst xmlns:p15="http://schemas.microsoft.com/office/powerpoint/2012/main"/>
+    </p:ext>
+  </p:extLst>
 </p:presentation>
 </file>
 
@@ -341,7 +346,7 @@
           <a:p>
             <a:fld id="{EA2E335F-38E9-4AF6-A657-DCE0E240DD53}" type="datetimeFigureOut">
               <a:rPr lang="en-IN" smtClean="0"/>
-              <a:t>24-03-2025</a:t>
+              <a:t>26-03-2025</a:t>
             </a:fld>
             <a:endParaRPr lang="en-IN"/>
           </a:p>
@@ -665,7 +670,7 @@
           <a:p>
             <a:fld id="{EA2E335F-38E9-4AF6-A657-DCE0E240DD53}" type="datetimeFigureOut">
               <a:rPr lang="en-IN" smtClean="0"/>
-              <a:t>24-03-2025</a:t>
+              <a:t>26-03-2025</a:t>
             </a:fld>
             <a:endParaRPr lang="en-IN"/>
           </a:p>
@@ -913,7 +918,7 @@
           <a:p>
             <a:fld id="{EA2E335F-38E9-4AF6-A657-DCE0E240DD53}" type="datetimeFigureOut">
               <a:rPr lang="en-IN" smtClean="0"/>
-              <a:t>24-03-2025</a:t>
+              <a:t>26-03-2025</a:t>
             </a:fld>
             <a:endParaRPr lang="en-IN"/>
           </a:p>
@@ -1252,7 +1257,7 @@
           <a:p>
             <a:fld id="{EA2E335F-38E9-4AF6-A657-DCE0E240DD53}" type="datetimeFigureOut">
               <a:rPr lang="en-IN" smtClean="0"/>
-              <a:t>24-03-2025</a:t>
+              <a:t>26-03-2025</a:t>
             </a:fld>
             <a:endParaRPr lang="en-IN"/>
           </a:p>
@@ -1599,7 +1604,7 @@
           <a:p>
             <a:fld id="{EA2E335F-38E9-4AF6-A657-DCE0E240DD53}" type="datetimeFigureOut">
               <a:rPr lang="en-IN" smtClean="0"/>
-              <a:t>24-03-2025</a:t>
+              <a:t>26-03-2025</a:t>
             </a:fld>
             <a:endParaRPr lang="en-IN"/>
           </a:p>
@@ -1973,7 +1978,7 @@
           <a:p>
             <a:fld id="{EA2E335F-38E9-4AF6-A657-DCE0E240DD53}" type="datetimeFigureOut">
               <a:rPr lang="en-IN" smtClean="0"/>
-              <a:t>24-03-2025</a:t>
+              <a:t>26-03-2025</a:t>
             </a:fld>
             <a:endParaRPr lang="en-IN"/>
           </a:p>
@@ -2443,7 +2448,7 @@
           <a:p>
             <a:fld id="{EA2E335F-38E9-4AF6-A657-DCE0E240DD53}" type="datetimeFigureOut">
               <a:rPr lang="en-IN" smtClean="0"/>
-              <a:t>24-03-2025</a:t>
+              <a:t>26-03-2025</a:t>
             </a:fld>
             <a:endParaRPr lang="en-IN"/>
           </a:p>
@@ -2648,7 +2653,7 @@
           <a:p>
             <a:fld id="{EA2E335F-38E9-4AF6-A657-DCE0E240DD53}" type="datetimeFigureOut">
               <a:rPr lang="en-IN" smtClean="0"/>
-              <a:t>24-03-2025</a:t>
+              <a:t>26-03-2025</a:t>
             </a:fld>
             <a:endParaRPr lang="en-IN"/>
           </a:p>
@@ -2859,7 +2864,7 @@
           <a:p>
             <a:fld id="{EA2E335F-38E9-4AF6-A657-DCE0E240DD53}" type="datetimeFigureOut">
               <a:rPr lang="en-IN" smtClean="0"/>
-              <a:t>24-03-2025</a:t>
+              <a:t>26-03-2025</a:t>
             </a:fld>
             <a:endParaRPr lang="en-IN"/>
           </a:p>
@@ -3090,7 +3095,7 @@
           <a:p>
             <a:fld id="{EA2E335F-38E9-4AF6-A657-DCE0E240DD53}" type="datetimeFigureOut">
               <a:rPr lang="en-IN" smtClean="0"/>
-              <a:t>24-03-2025</a:t>
+              <a:t>26-03-2025</a:t>
             </a:fld>
             <a:endParaRPr lang="en-IN"/>
           </a:p>
@@ -3338,7 +3343,7 @@
           <a:p>
             <a:fld id="{EA2E335F-38E9-4AF6-A657-DCE0E240DD53}" type="datetimeFigureOut">
               <a:rPr lang="en-IN" smtClean="0"/>
-              <a:t>24-03-2025</a:t>
+              <a:t>26-03-2025</a:t>
             </a:fld>
             <a:endParaRPr lang="en-IN"/>
           </a:p>
@@ -3636,7 +3641,7 @@
           <a:p>
             <a:fld id="{EA2E335F-38E9-4AF6-A657-DCE0E240DD53}" type="datetimeFigureOut">
               <a:rPr lang="en-IN" smtClean="0"/>
-              <a:t>24-03-2025</a:t>
+              <a:t>26-03-2025</a:t>
             </a:fld>
             <a:endParaRPr lang="en-IN"/>
           </a:p>
@@ -4018,7 +4023,7 @@
           <a:p>
             <a:fld id="{EA2E335F-38E9-4AF6-A657-DCE0E240DD53}" type="datetimeFigureOut">
               <a:rPr lang="en-IN" smtClean="0"/>
-              <a:t>24-03-2025</a:t>
+              <a:t>26-03-2025</a:t>
             </a:fld>
             <a:endParaRPr lang="en-IN"/>
           </a:p>
@@ -4167,7 +4172,7 @@
           <a:p>
             <a:fld id="{EA2E335F-38E9-4AF6-A657-DCE0E240DD53}" type="datetimeFigureOut">
               <a:rPr lang="en-IN" smtClean="0"/>
-              <a:t>24-03-2025</a:t>
+              <a:t>26-03-2025</a:t>
             </a:fld>
             <a:endParaRPr lang="en-IN"/>
           </a:p>
@@ -4293,7 +4298,7 @@
           <a:p>
             <a:fld id="{EA2E335F-38E9-4AF6-A657-DCE0E240DD53}" type="datetimeFigureOut">
               <a:rPr lang="en-IN" smtClean="0"/>
-              <a:t>24-03-2025</a:t>
+              <a:t>26-03-2025</a:t>
             </a:fld>
             <a:endParaRPr lang="en-IN"/>
           </a:p>
@@ -4548,7 +4553,7 @@
           <a:p>
             <a:fld id="{EA2E335F-38E9-4AF6-A657-DCE0E240DD53}" type="datetimeFigureOut">
               <a:rPr lang="en-IN" smtClean="0"/>
-              <a:t>24-03-2025</a:t>
+              <a:t>26-03-2025</a:t>
             </a:fld>
             <a:endParaRPr lang="en-IN"/>
           </a:p>
@@ -4863,7 +4868,7 @@
           <a:p>
             <a:fld id="{EA2E335F-38E9-4AF6-A657-DCE0E240DD53}" type="datetimeFigureOut">
               <a:rPr lang="en-IN" smtClean="0"/>
-              <a:t>24-03-2025</a:t>
+              <a:t>26-03-2025</a:t>
             </a:fld>
             <a:endParaRPr lang="en-IN"/>
           </a:p>
@@ -5107,7 +5112,7 @@
           <a:p>
             <a:fld id="{EA2E335F-38E9-4AF6-A657-DCE0E240DD53}" type="datetimeFigureOut">
               <a:rPr lang="en-IN" smtClean="0"/>
-              <a:t>24-03-2025</a:t>
+              <a:t>26-03-2025</a:t>
             </a:fld>
             <a:endParaRPr lang="en-IN"/>
           </a:p>
@@ -5694,7 +5699,7 @@
                 <a:latin typeface="Times New Roman" panose="02020603050405020304" pitchFamily="18" charset="0"/>
                 <a:cs typeface="Times New Roman" panose="02020603050405020304" pitchFamily="18" charset="0"/>
               </a:rPr>
-              <a:t>Gen AI-Based Email Classification and OCR</a:t>
+              <a:t>Gen AI Orchestrator for Email and Document Triage</a:t>
             </a:r>
             <a:br>
               <a:rPr lang="en-IN" sz="2400" dirty="0">
@@ -6721,7 +6726,41 @@
                 <a:ea typeface="Aptos" panose="020B0004020202020204" pitchFamily="34" charset="0"/>
                 <a:cs typeface="Times New Roman" panose="02020603050405020304" pitchFamily="18" charset="0"/>
               </a:rPr>
-              <a:t>: The Hugging Face zero-shot classification model will classify the email into one of the predefined labels such as "Fee Payment" or "Money Movement-Inbound".</a:t>
+              <a:t>: The Hugging Face zero-shot classification model will classify the email into one of the predefined labels such as "Fee Payment" </a:t>
+            </a:r>
+            <a:r>
+              <a:rPr lang="en-IN" kern="100" dirty="0">
+                <a:latin typeface="Times New Roman" panose="02020603050405020304" pitchFamily="18" charset="0"/>
+                <a:ea typeface="Aptos" panose="020B0004020202020204" pitchFamily="34" charset="0"/>
+                <a:cs typeface="Times New Roman" panose="02020603050405020304" pitchFamily="18" charset="0"/>
+              </a:rPr>
+              <a:t>“AU </a:t>
+            </a:r>
+            <a:r>
+              <a:rPr lang="en-IN" kern="100" dirty="0" err="1">
+                <a:latin typeface="Times New Roman" panose="02020603050405020304" pitchFamily="18" charset="0"/>
+                <a:ea typeface="Aptos" panose="020B0004020202020204" pitchFamily="34" charset="0"/>
+                <a:cs typeface="Times New Roman" panose="02020603050405020304" pitchFamily="18" charset="0"/>
+              </a:rPr>
+              <a:t>Transfer</a:t>
+            </a:r>
+            <a:r>
+              <a:rPr lang="en-IN" sz="1800" kern="100" dirty="0" err="1">
+                <a:effectLst/>
+                <a:latin typeface="Times New Roman" panose="02020603050405020304" pitchFamily="18" charset="0"/>
+                <a:ea typeface="Aptos" panose="020B0004020202020204" pitchFamily="34" charset="0"/>
+                <a:cs typeface="Times New Roman" panose="02020603050405020304" pitchFamily="18" charset="0"/>
+              </a:rPr>
+              <a:t>“,”Closing</a:t>
+            </a:r>
+            <a:r>
+              <a:rPr lang="en-IN" sz="1800" kern="100" dirty="0">
+                <a:effectLst/>
+                <a:latin typeface="Times New Roman" panose="02020603050405020304" pitchFamily="18" charset="0"/>
+                <a:ea typeface="Aptos" panose="020B0004020202020204" pitchFamily="34" charset="0"/>
+                <a:cs typeface="Times New Roman" panose="02020603050405020304" pitchFamily="18" charset="0"/>
+              </a:rPr>
+              <a:t> Notice”.</a:t>
             </a:r>
           </a:p>
           <a:p>

</xml_diff>